<commit_message>
1st and 2st Amp
</commit_message>
<xml_diff>
--- a/IonTrap_PM2.5_Outline.pptx
+++ b/IonTrap_PM2.5_Outline.pptx
@@ -243,7 +243,7 @@
           <a:p>
             <a:fld id="{E585762B-4CC2-4665-AF14-A60F7576B822}" type="datetimeFigureOut">
               <a:rPr lang="en-US" smtClean="0"/>
-              <a:t>6/28/2018</a:t>
+              <a:t>6/29/2018</a:t>
             </a:fld>
             <a:endParaRPr lang="en-US"/>
           </a:p>
@@ -413,7 +413,7 @@
           <a:p>
             <a:fld id="{E585762B-4CC2-4665-AF14-A60F7576B822}" type="datetimeFigureOut">
               <a:rPr lang="en-US" smtClean="0"/>
-              <a:t>6/28/2018</a:t>
+              <a:t>6/29/2018</a:t>
             </a:fld>
             <a:endParaRPr lang="en-US"/>
           </a:p>
@@ -593,7 +593,7 @@
           <a:p>
             <a:fld id="{E585762B-4CC2-4665-AF14-A60F7576B822}" type="datetimeFigureOut">
               <a:rPr lang="en-US" smtClean="0"/>
-              <a:t>6/28/2018</a:t>
+              <a:t>6/29/2018</a:t>
             </a:fld>
             <a:endParaRPr lang="en-US"/>
           </a:p>
@@ -763,7 +763,7 @@
           <a:p>
             <a:fld id="{E585762B-4CC2-4665-AF14-A60F7576B822}" type="datetimeFigureOut">
               <a:rPr lang="en-US" smtClean="0"/>
-              <a:t>6/28/2018</a:t>
+              <a:t>6/29/2018</a:t>
             </a:fld>
             <a:endParaRPr lang="en-US"/>
           </a:p>
@@ -1009,7 +1009,7 @@
           <a:p>
             <a:fld id="{E585762B-4CC2-4665-AF14-A60F7576B822}" type="datetimeFigureOut">
               <a:rPr lang="en-US" smtClean="0"/>
-              <a:t>6/28/2018</a:t>
+              <a:t>6/29/2018</a:t>
             </a:fld>
             <a:endParaRPr lang="en-US"/>
           </a:p>
@@ -1241,7 +1241,7 @@
           <a:p>
             <a:fld id="{E585762B-4CC2-4665-AF14-A60F7576B822}" type="datetimeFigureOut">
               <a:rPr lang="en-US" smtClean="0"/>
-              <a:t>6/28/2018</a:t>
+              <a:t>6/29/2018</a:t>
             </a:fld>
             <a:endParaRPr lang="en-US"/>
           </a:p>
@@ -1608,7 +1608,7 @@
           <a:p>
             <a:fld id="{E585762B-4CC2-4665-AF14-A60F7576B822}" type="datetimeFigureOut">
               <a:rPr lang="en-US" smtClean="0"/>
-              <a:t>6/28/2018</a:t>
+              <a:t>6/29/2018</a:t>
             </a:fld>
             <a:endParaRPr lang="en-US"/>
           </a:p>
@@ -1726,7 +1726,7 @@
           <a:p>
             <a:fld id="{E585762B-4CC2-4665-AF14-A60F7576B822}" type="datetimeFigureOut">
               <a:rPr lang="en-US" smtClean="0"/>
-              <a:t>6/28/2018</a:t>
+              <a:t>6/29/2018</a:t>
             </a:fld>
             <a:endParaRPr lang="en-US"/>
           </a:p>
@@ -1821,7 +1821,7 @@
           <a:p>
             <a:fld id="{E585762B-4CC2-4665-AF14-A60F7576B822}" type="datetimeFigureOut">
               <a:rPr lang="en-US" smtClean="0"/>
-              <a:t>6/28/2018</a:t>
+              <a:t>6/29/2018</a:t>
             </a:fld>
             <a:endParaRPr lang="en-US"/>
           </a:p>
@@ -2098,7 +2098,7 @@
           <a:p>
             <a:fld id="{E585762B-4CC2-4665-AF14-A60F7576B822}" type="datetimeFigureOut">
               <a:rPr lang="en-US" smtClean="0"/>
-              <a:t>6/28/2018</a:t>
+              <a:t>6/29/2018</a:t>
             </a:fld>
             <a:endParaRPr lang="en-US"/>
           </a:p>
@@ -2351,7 +2351,7 @@
           <a:p>
             <a:fld id="{E585762B-4CC2-4665-AF14-A60F7576B822}" type="datetimeFigureOut">
               <a:rPr lang="en-US" smtClean="0"/>
-              <a:t>6/28/2018</a:t>
+              <a:t>6/29/2018</a:t>
             </a:fld>
             <a:endParaRPr lang="en-US"/>
           </a:p>
@@ -2564,7 +2564,7 @@
           <a:p>
             <a:fld id="{E585762B-4CC2-4665-AF14-A60F7576B822}" type="datetimeFigureOut">
               <a:rPr lang="en-US" smtClean="0"/>
-              <a:t>6/28/2018</a:t>
+              <a:t>6/29/2018</a:t>
             </a:fld>
             <a:endParaRPr lang="en-US"/>
           </a:p>
@@ -2969,30 +2969,365 @@
           <a:chExt cx="0" cy="0"/>
         </a:xfrm>
       </p:grpSpPr>
+      <p:sp>
+        <p:nvSpPr>
+          <p:cNvPr id="6" name="矩形 5"/>
+          <p:cNvSpPr/>
+          <p:nvPr/>
+        </p:nvSpPr>
+        <p:spPr>
+          <a:xfrm>
+            <a:off x="2647455" y="2106524"/>
+            <a:ext cx="601172" cy="383106"/>
+          </a:xfrm>
+          <a:prstGeom prst="rect">
+            <a:avLst/>
+          </a:prstGeom>
+          <a:solidFill>
+            <a:schemeClr val="bg1"/>
+          </a:solidFill>
+          <a:ln w="25400">
+            <a:solidFill>
+              <a:schemeClr val="tx1"/>
+            </a:solidFill>
+          </a:ln>
+        </p:spPr>
+        <p:style>
+          <a:lnRef idx="2">
+            <a:schemeClr val="accent1">
+              <a:shade val="50000"/>
+            </a:schemeClr>
+          </a:lnRef>
+          <a:fillRef idx="1">
+            <a:schemeClr val="accent1"/>
+          </a:fillRef>
+          <a:effectRef idx="0">
+            <a:schemeClr val="accent1"/>
+          </a:effectRef>
+          <a:fontRef idx="minor">
+            <a:schemeClr val="lt1"/>
+          </a:fontRef>
+        </p:style>
+        <p:txBody>
+          <a:bodyPr rtlCol="0" anchor="ctr"/>
+          <a:lstStyle/>
+          <a:p>
+            <a:pPr algn="ctr"/>
+            <a:endParaRPr lang="en-US"/>
+          </a:p>
+        </p:txBody>
+      </p:sp>
+      <p:sp>
+        <p:nvSpPr>
+          <p:cNvPr id="7" name="文字方塊 6"/>
+          <p:cNvSpPr txBox="1"/>
+          <p:nvPr/>
+        </p:nvSpPr>
+        <p:spPr>
+          <a:xfrm>
+            <a:off x="2692047" y="1722515"/>
+            <a:ext cx="511988" cy="400110"/>
+          </a:xfrm>
+          <a:prstGeom prst="rect">
+            <a:avLst/>
+          </a:prstGeom>
+          <a:noFill/>
+        </p:spPr>
+        <p:txBody>
+          <a:bodyPr wrap="square" rtlCol="0">
+            <a:spAutoFit/>
+          </a:bodyPr>
+          <a:lstStyle/>
+          <a:p>
+            <a:r>
+              <a:rPr lang="en-US" sz="2000" b="1" dirty="0" smtClean="0"/>
+              <a:t>PC </a:t>
+            </a:r>
+            <a:endParaRPr lang="en-US" sz="2000" b="1" dirty="0"/>
+          </a:p>
+        </p:txBody>
+      </p:sp>
+      <p:cxnSp>
+        <p:nvCxnSpPr>
+          <p:cNvPr id="14" name="直線單箭頭接點 13"/>
+          <p:cNvCxnSpPr/>
+          <p:nvPr/>
+        </p:nvCxnSpPr>
+        <p:spPr>
+          <a:xfrm>
+            <a:off x="2948041" y="2560070"/>
+            <a:ext cx="0" cy="1157716"/>
+          </a:xfrm>
+          <a:prstGeom prst="straightConnector1">
+            <a:avLst/>
+          </a:prstGeom>
+          <a:ln>
+            <a:solidFill>
+              <a:schemeClr val="tx1"/>
+            </a:solidFill>
+            <a:tailEnd type="triangle"/>
+          </a:ln>
+        </p:spPr>
+        <p:style>
+          <a:lnRef idx="1">
+            <a:schemeClr val="accent1"/>
+          </a:lnRef>
+          <a:fillRef idx="0">
+            <a:schemeClr val="accent1"/>
+          </a:fillRef>
+          <a:effectRef idx="0">
+            <a:schemeClr val="accent1"/>
+          </a:effectRef>
+          <a:fontRef idx="minor">
+            <a:schemeClr val="tx1"/>
+          </a:fontRef>
+        </p:style>
+      </p:cxnSp>
+      <p:sp>
+        <p:nvSpPr>
+          <p:cNvPr id="17" name="文字方塊 16"/>
+          <p:cNvSpPr txBox="1"/>
+          <p:nvPr/>
+        </p:nvSpPr>
+        <p:spPr>
+          <a:xfrm>
+            <a:off x="2948041" y="2964411"/>
+            <a:ext cx="2013639" cy="523220"/>
+          </a:xfrm>
+          <a:prstGeom prst="rect">
+            <a:avLst/>
+          </a:prstGeom>
+          <a:noFill/>
+        </p:spPr>
+        <p:txBody>
+          <a:bodyPr wrap="square" rtlCol="0">
+            <a:spAutoFit/>
+          </a:bodyPr>
+          <a:lstStyle/>
+          <a:p>
+            <a:r>
+              <a:rPr lang="en-US" sz="1400" b="1" dirty="0" smtClean="0"/>
+              <a:t>SCPI</a:t>
+            </a:r>
+            <a:br>
+              <a:rPr lang="en-US" sz="1400" b="1" dirty="0" smtClean="0"/>
+            </a:br>
+            <a:r>
+              <a:rPr lang="en-US" sz="1400" dirty="0" smtClean="0"/>
+              <a:t>python xx.py 192.168.0.X </a:t>
+            </a:r>
+            <a:r>
+              <a:rPr lang="en-US" sz="1400" b="1" dirty="0" smtClean="0"/>
+              <a:t>  </a:t>
+            </a:r>
+            <a:endParaRPr lang="en-US" sz="1400" b="1" dirty="0"/>
+          </a:p>
+        </p:txBody>
+      </p:sp>
+      <p:sp>
+        <p:nvSpPr>
+          <p:cNvPr id="18" name="矩形 17"/>
+          <p:cNvSpPr/>
+          <p:nvPr/>
+        </p:nvSpPr>
+        <p:spPr>
+          <a:xfrm>
+            <a:off x="2649322" y="4018665"/>
+            <a:ext cx="688488" cy="666427"/>
+          </a:xfrm>
+          <a:prstGeom prst="rect">
+            <a:avLst/>
+          </a:prstGeom>
+          <a:solidFill>
+            <a:schemeClr val="bg1"/>
+          </a:solidFill>
+          <a:ln w="25400">
+            <a:solidFill>
+              <a:schemeClr val="tx1"/>
+            </a:solidFill>
+          </a:ln>
+        </p:spPr>
+        <p:style>
+          <a:lnRef idx="2">
+            <a:schemeClr val="accent1">
+              <a:shade val="50000"/>
+            </a:schemeClr>
+          </a:lnRef>
+          <a:fillRef idx="1">
+            <a:schemeClr val="accent1"/>
+          </a:fillRef>
+          <a:effectRef idx="0">
+            <a:schemeClr val="accent1"/>
+          </a:effectRef>
+          <a:fontRef idx="minor">
+            <a:schemeClr val="lt1"/>
+          </a:fontRef>
+        </p:style>
+        <p:txBody>
+          <a:bodyPr rtlCol="0" anchor="ctr"/>
+          <a:lstStyle/>
+          <a:p>
+            <a:pPr algn="ctr"/>
+            <a:endParaRPr lang="en-US"/>
+          </a:p>
+        </p:txBody>
+      </p:sp>
+      <p:sp>
+        <p:nvSpPr>
+          <p:cNvPr id="19" name="文字方塊 18"/>
+          <p:cNvSpPr txBox="1"/>
+          <p:nvPr/>
+        </p:nvSpPr>
+        <p:spPr>
+          <a:xfrm>
+            <a:off x="2291631" y="3695717"/>
+            <a:ext cx="2670049" cy="338554"/>
+          </a:xfrm>
+          <a:prstGeom prst="rect">
+            <a:avLst/>
+          </a:prstGeom>
+          <a:noFill/>
+        </p:spPr>
+        <p:txBody>
+          <a:bodyPr wrap="square" rtlCol="0">
+            <a:spAutoFit/>
+          </a:bodyPr>
+          <a:lstStyle/>
+          <a:p>
+            <a:r>
+              <a:rPr lang="en-US" sz="1600" b="1" dirty="0" smtClean="0"/>
+              <a:t>FPGA (Embedded System) </a:t>
+            </a:r>
+            <a:endParaRPr lang="en-US" sz="1600" b="1" dirty="0"/>
+          </a:p>
+        </p:txBody>
+      </p:sp>
+      <p:cxnSp>
+        <p:nvCxnSpPr>
+          <p:cNvPr id="23" name="直線單箭頭接點 22"/>
+          <p:cNvCxnSpPr/>
+          <p:nvPr/>
+        </p:nvCxnSpPr>
+        <p:spPr>
+          <a:xfrm flipH="1">
+            <a:off x="3437882" y="4517499"/>
+            <a:ext cx="5845604" cy="28527"/>
+          </a:xfrm>
+          <a:prstGeom prst="straightConnector1">
+            <a:avLst/>
+          </a:prstGeom>
+          <a:ln>
+            <a:solidFill>
+              <a:schemeClr val="tx1"/>
+            </a:solidFill>
+            <a:tailEnd type="triangle"/>
+          </a:ln>
+        </p:spPr>
+        <p:style>
+          <a:lnRef idx="1">
+            <a:schemeClr val="accent1"/>
+          </a:lnRef>
+          <a:fillRef idx="0">
+            <a:schemeClr val="accent1"/>
+          </a:fillRef>
+          <a:effectRef idx="0">
+            <a:schemeClr val="accent1"/>
+          </a:effectRef>
+          <a:fontRef idx="minor">
+            <a:schemeClr val="tx1"/>
+          </a:fontRef>
+        </p:style>
+      </p:cxnSp>
+      <p:cxnSp>
+        <p:nvCxnSpPr>
+          <p:cNvPr id="24" name="直線單箭頭接點 23"/>
+          <p:cNvCxnSpPr/>
+          <p:nvPr/>
+        </p:nvCxnSpPr>
+        <p:spPr>
+          <a:xfrm>
+            <a:off x="3493650" y="4162919"/>
+            <a:ext cx="2581456" cy="0"/>
+          </a:xfrm>
+          <a:prstGeom prst="straightConnector1">
+            <a:avLst/>
+          </a:prstGeom>
+          <a:ln>
+            <a:solidFill>
+              <a:schemeClr val="tx1"/>
+            </a:solidFill>
+            <a:tailEnd type="triangle"/>
+          </a:ln>
+        </p:spPr>
+        <p:style>
+          <a:lnRef idx="1">
+            <a:schemeClr val="accent1"/>
+          </a:lnRef>
+          <a:fillRef idx="0">
+            <a:schemeClr val="accent1"/>
+          </a:fillRef>
+          <a:effectRef idx="0">
+            <a:schemeClr val="accent1"/>
+          </a:effectRef>
+          <a:fontRef idx="minor">
+            <a:schemeClr val="tx1"/>
+          </a:fontRef>
+        </p:style>
+      </p:cxnSp>
+      <p:sp>
+        <p:nvSpPr>
+          <p:cNvPr id="29" name="文字方塊 28"/>
+          <p:cNvSpPr txBox="1"/>
+          <p:nvPr/>
+        </p:nvSpPr>
+        <p:spPr>
+          <a:xfrm>
+            <a:off x="3599237" y="4138154"/>
+            <a:ext cx="2375840" cy="307777"/>
+          </a:xfrm>
+          <a:prstGeom prst="rect">
+            <a:avLst/>
+          </a:prstGeom>
+          <a:noFill/>
+        </p:spPr>
+        <p:txBody>
+          <a:bodyPr wrap="square" rtlCol="0">
+            <a:spAutoFit/>
+          </a:bodyPr>
+          <a:lstStyle/>
+          <a:p>
+            <a:r>
+              <a:rPr lang="en-US" sz="1400" b="1" dirty="0" smtClean="0"/>
+              <a:t>Function Generator: f1+n*f2 </a:t>
+            </a:r>
+            <a:endParaRPr lang="en-US" sz="1400" b="1" dirty="0"/>
+          </a:p>
+        </p:txBody>
+      </p:sp>
       <p:grpSp>
         <p:nvGrpSpPr>
-          <p:cNvPr id="51" name="群組 50"/>
+          <p:cNvPr id="34" name="群組 33"/>
           <p:cNvGrpSpPr/>
           <p:nvPr/>
         </p:nvGrpSpPr>
         <p:grpSpPr>
           <a:xfrm>
-            <a:off x="2865067" y="1722515"/>
-            <a:ext cx="6578103" cy="3308268"/>
-            <a:chOff x="3082043" y="2078977"/>
-            <a:chExt cx="6578103" cy="3308268"/>
+            <a:off x="9369745" y="3646407"/>
+            <a:ext cx="1143389" cy="983494"/>
+            <a:chOff x="7133214" y="4026115"/>
+            <a:chExt cx="1352416" cy="1070230"/>
           </a:xfrm>
         </p:grpSpPr>
         <p:sp>
           <p:nvSpPr>
-            <p:cNvPr id="6" name="矩形 5"/>
+            <p:cNvPr id="5" name="矩形 4"/>
             <p:cNvSpPr/>
             <p:nvPr/>
           </p:nvSpPr>
           <p:spPr>
             <a:xfrm>
-              <a:off x="3437867" y="2462986"/>
-              <a:ext cx="601172" cy="383106"/>
+              <a:off x="7133214" y="4333892"/>
+              <a:ext cx="1352416" cy="762453"/>
             </a:xfrm>
             <a:prstGeom prst="rect">
               <a:avLst/>
@@ -3033,452 +3368,14 @@
         </p:sp>
         <p:sp>
           <p:nvSpPr>
-            <p:cNvPr id="7" name="文字方塊 6"/>
+            <p:cNvPr id="32" name="文字方塊 31"/>
             <p:cNvSpPr txBox="1"/>
             <p:nvPr/>
           </p:nvSpPr>
           <p:spPr>
             <a:xfrm>
-              <a:off x="3482459" y="2078977"/>
-              <a:ext cx="511988" cy="400110"/>
-            </a:xfrm>
-            <a:prstGeom prst="rect">
-              <a:avLst/>
-            </a:prstGeom>
-            <a:noFill/>
-          </p:spPr>
-          <p:txBody>
-            <a:bodyPr wrap="square" rtlCol="0">
-              <a:spAutoFit/>
-            </a:bodyPr>
-            <a:lstStyle/>
-            <a:p>
-              <a:r>
-                <a:rPr lang="en-US" sz="2000" b="1" dirty="0" smtClean="0"/>
-                <a:t>PC </a:t>
-              </a:r>
-              <a:endParaRPr lang="en-US" sz="2000" b="1" dirty="0"/>
-            </a:p>
-          </p:txBody>
-        </p:sp>
-        <p:cxnSp>
-          <p:nvCxnSpPr>
-            <p:cNvPr id="14" name="直線單箭頭接點 13"/>
-            <p:cNvCxnSpPr/>
-            <p:nvPr/>
-          </p:nvCxnSpPr>
-          <p:spPr>
-            <a:xfrm>
-              <a:off x="3738453" y="2916532"/>
-              <a:ext cx="0" cy="1157716"/>
-            </a:xfrm>
-            <a:prstGeom prst="straightConnector1">
-              <a:avLst/>
-            </a:prstGeom>
-            <a:ln>
-              <a:solidFill>
-                <a:schemeClr val="tx1"/>
-              </a:solidFill>
-              <a:tailEnd type="triangle"/>
-            </a:ln>
-          </p:spPr>
-          <p:style>
-            <a:lnRef idx="1">
-              <a:schemeClr val="accent1"/>
-            </a:lnRef>
-            <a:fillRef idx="0">
-              <a:schemeClr val="accent1"/>
-            </a:fillRef>
-            <a:effectRef idx="0">
-              <a:schemeClr val="accent1"/>
-            </a:effectRef>
-            <a:fontRef idx="minor">
-              <a:schemeClr val="tx1"/>
-            </a:fontRef>
-          </p:style>
-        </p:cxnSp>
-        <p:sp>
-          <p:nvSpPr>
-            <p:cNvPr id="17" name="文字方塊 16"/>
-            <p:cNvSpPr txBox="1"/>
-            <p:nvPr/>
-          </p:nvSpPr>
-          <p:spPr>
-            <a:xfrm>
-              <a:off x="3738453" y="3320873"/>
-              <a:ext cx="2013639" cy="523220"/>
-            </a:xfrm>
-            <a:prstGeom prst="rect">
-              <a:avLst/>
-            </a:prstGeom>
-            <a:noFill/>
-          </p:spPr>
-          <p:txBody>
-            <a:bodyPr wrap="square" rtlCol="0">
-              <a:spAutoFit/>
-            </a:bodyPr>
-            <a:lstStyle/>
-            <a:p>
-              <a:r>
-                <a:rPr lang="en-US" sz="1400" b="1" dirty="0" smtClean="0"/>
-                <a:t>SCPI</a:t>
-              </a:r>
-              <a:br>
-                <a:rPr lang="en-US" sz="1400" b="1" dirty="0" smtClean="0"/>
-              </a:br>
-              <a:r>
-                <a:rPr lang="en-US" sz="1400" dirty="0" smtClean="0"/>
-                <a:t>python xx.py 192.168.0.X </a:t>
-              </a:r>
-              <a:r>
-                <a:rPr lang="en-US" sz="1400" b="1" dirty="0" smtClean="0"/>
-                <a:t>  </a:t>
-              </a:r>
-              <a:endParaRPr lang="en-US" sz="1400" b="1" dirty="0"/>
-            </a:p>
-          </p:txBody>
-        </p:sp>
-        <p:sp>
-          <p:nvSpPr>
-            <p:cNvPr id="18" name="矩形 17"/>
-            <p:cNvSpPr/>
-            <p:nvPr/>
-          </p:nvSpPr>
-          <p:spPr>
-            <a:xfrm>
-              <a:off x="3439734" y="4375127"/>
-              <a:ext cx="688488" cy="666427"/>
-            </a:xfrm>
-            <a:prstGeom prst="rect">
-              <a:avLst/>
-            </a:prstGeom>
-            <a:solidFill>
-              <a:schemeClr val="bg1"/>
-            </a:solidFill>
-            <a:ln w="25400">
-              <a:solidFill>
-                <a:schemeClr val="tx1"/>
-              </a:solidFill>
-            </a:ln>
-          </p:spPr>
-          <p:style>
-            <a:lnRef idx="2">
-              <a:schemeClr val="accent1">
-                <a:shade val="50000"/>
-              </a:schemeClr>
-            </a:lnRef>
-            <a:fillRef idx="1">
-              <a:schemeClr val="accent1"/>
-            </a:fillRef>
-            <a:effectRef idx="0">
-              <a:schemeClr val="accent1"/>
-            </a:effectRef>
-            <a:fontRef idx="minor">
-              <a:schemeClr val="lt1"/>
-            </a:fontRef>
-          </p:style>
-          <p:txBody>
-            <a:bodyPr rtlCol="0" anchor="ctr"/>
-            <a:lstStyle/>
-            <a:p>
-              <a:pPr algn="ctr"/>
-              <a:endParaRPr lang="en-US"/>
-            </a:p>
-          </p:txBody>
-        </p:sp>
-        <p:sp>
-          <p:nvSpPr>
-            <p:cNvPr id="19" name="文字方塊 18"/>
-            <p:cNvSpPr txBox="1"/>
-            <p:nvPr/>
-          </p:nvSpPr>
-          <p:spPr>
-            <a:xfrm>
-              <a:off x="3082043" y="4052179"/>
-              <a:ext cx="2670049" cy="338554"/>
-            </a:xfrm>
-            <a:prstGeom prst="rect">
-              <a:avLst/>
-            </a:prstGeom>
-            <a:noFill/>
-          </p:spPr>
-          <p:txBody>
-            <a:bodyPr wrap="square" rtlCol="0">
-              <a:spAutoFit/>
-            </a:bodyPr>
-            <a:lstStyle/>
-            <a:p>
-              <a:r>
-                <a:rPr lang="en-US" sz="1600" b="1" dirty="0" smtClean="0"/>
-                <a:t>FPGA (Embedded System) </a:t>
-              </a:r>
-              <a:endParaRPr lang="en-US" sz="1600" b="1" dirty="0"/>
-            </a:p>
-          </p:txBody>
-        </p:sp>
-        <p:cxnSp>
-          <p:nvCxnSpPr>
-            <p:cNvPr id="23" name="直線單箭頭接點 22"/>
-            <p:cNvCxnSpPr/>
-            <p:nvPr/>
-          </p:nvCxnSpPr>
-          <p:spPr>
-            <a:xfrm flipH="1" flipV="1">
-              <a:off x="4228293" y="4902487"/>
-              <a:ext cx="4202785" cy="3789"/>
-            </a:xfrm>
-            <a:prstGeom prst="straightConnector1">
-              <a:avLst/>
-            </a:prstGeom>
-            <a:ln>
-              <a:solidFill>
-                <a:schemeClr val="tx1"/>
-              </a:solidFill>
-              <a:tailEnd type="triangle"/>
-            </a:ln>
-          </p:spPr>
-          <p:style>
-            <a:lnRef idx="1">
-              <a:schemeClr val="accent1"/>
-            </a:lnRef>
-            <a:fillRef idx="0">
-              <a:schemeClr val="accent1"/>
-            </a:fillRef>
-            <a:effectRef idx="0">
-              <a:schemeClr val="accent1"/>
-            </a:effectRef>
-            <a:fontRef idx="minor">
-              <a:schemeClr val="tx1"/>
-            </a:fontRef>
-          </p:style>
-        </p:cxnSp>
-        <p:cxnSp>
-          <p:nvCxnSpPr>
-            <p:cNvPr id="24" name="直線單箭頭接點 23"/>
-            <p:cNvCxnSpPr/>
-            <p:nvPr/>
-          </p:nvCxnSpPr>
-          <p:spPr>
-            <a:xfrm>
-              <a:off x="4284062" y="4519381"/>
-              <a:ext cx="2581456" cy="0"/>
-            </a:xfrm>
-            <a:prstGeom prst="straightConnector1">
-              <a:avLst/>
-            </a:prstGeom>
-            <a:ln>
-              <a:solidFill>
-                <a:schemeClr val="tx1"/>
-              </a:solidFill>
-              <a:tailEnd type="triangle"/>
-            </a:ln>
-          </p:spPr>
-          <p:style>
-            <a:lnRef idx="1">
-              <a:schemeClr val="accent1"/>
-            </a:lnRef>
-            <a:fillRef idx="0">
-              <a:schemeClr val="accent1"/>
-            </a:fillRef>
-            <a:effectRef idx="0">
-              <a:schemeClr val="accent1"/>
-            </a:effectRef>
-            <a:fontRef idx="minor">
-              <a:schemeClr val="tx1"/>
-            </a:fontRef>
-          </p:style>
-        </p:cxnSp>
-        <p:sp>
-          <p:nvSpPr>
-            <p:cNvPr id="29" name="文字方塊 28"/>
-            <p:cNvSpPr txBox="1"/>
-            <p:nvPr/>
-          </p:nvSpPr>
-          <p:spPr>
-            <a:xfrm>
-              <a:off x="4389649" y="4494616"/>
-              <a:ext cx="2375840" cy="307777"/>
-            </a:xfrm>
-            <a:prstGeom prst="rect">
-              <a:avLst/>
-            </a:prstGeom>
-            <a:noFill/>
-          </p:spPr>
-          <p:txBody>
-            <a:bodyPr wrap="square" rtlCol="0">
-              <a:spAutoFit/>
-            </a:bodyPr>
-            <a:lstStyle/>
-            <a:p>
-              <a:r>
-                <a:rPr lang="en-US" sz="1400" b="1" dirty="0" smtClean="0"/>
-                <a:t>Function Generator: f1+n*f2</a:t>
-              </a:r>
-              <a:r>
-                <a:rPr lang="en-US" sz="1400" b="1" dirty="0" smtClean="0"/>
-                <a:t> </a:t>
-              </a:r>
-              <a:endParaRPr lang="en-US" sz="1400" b="1" dirty="0"/>
-            </a:p>
-          </p:txBody>
-        </p:sp>
-        <p:grpSp>
-          <p:nvGrpSpPr>
-            <p:cNvPr id="34" name="群組 33"/>
-            <p:cNvGrpSpPr/>
-            <p:nvPr/>
-          </p:nvGrpSpPr>
-          <p:grpSpPr>
-            <a:xfrm>
-              <a:off x="8516757" y="4082956"/>
-              <a:ext cx="1143389" cy="983494"/>
-              <a:chOff x="7133214" y="4026115"/>
-              <a:chExt cx="1352416" cy="1070230"/>
-            </a:xfrm>
-          </p:grpSpPr>
-          <p:sp>
-            <p:nvSpPr>
-              <p:cNvPr id="5" name="矩形 4"/>
-              <p:cNvSpPr/>
-              <p:nvPr/>
-            </p:nvSpPr>
-            <p:spPr>
-              <a:xfrm>
-                <a:off x="7133214" y="4333892"/>
-                <a:ext cx="1352416" cy="762453"/>
-              </a:xfrm>
-              <a:prstGeom prst="rect">
-                <a:avLst/>
-              </a:prstGeom>
-              <a:solidFill>
-                <a:schemeClr val="bg1"/>
-              </a:solidFill>
-              <a:ln w="25400">
-                <a:solidFill>
-                  <a:schemeClr val="tx1"/>
-                </a:solidFill>
-              </a:ln>
-            </p:spPr>
-            <p:style>
-              <a:lnRef idx="2">
-                <a:schemeClr val="accent1">
-                  <a:shade val="50000"/>
-                </a:schemeClr>
-              </a:lnRef>
-              <a:fillRef idx="1">
-                <a:schemeClr val="accent1"/>
-              </a:fillRef>
-              <a:effectRef idx="0">
-                <a:schemeClr val="accent1"/>
-              </a:effectRef>
-              <a:fontRef idx="minor">
-                <a:schemeClr val="lt1"/>
-              </a:fontRef>
-            </p:style>
-            <p:txBody>
-              <a:bodyPr rtlCol="0" anchor="ctr"/>
-              <a:lstStyle/>
-              <a:p>
-                <a:pPr algn="ctr"/>
-                <a:endParaRPr lang="en-US"/>
-              </a:p>
-            </p:txBody>
-          </p:sp>
-          <p:sp>
-            <p:nvSpPr>
-              <p:cNvPr id="32" name="文字方塊 31"/>
-              <p:cNvSpPr txBox="1"/>
-              <p:nvPr/>
-            </p:nvSpPr>
-            <p:spPr>
-              <a:xfrm>
-                <a:off x="7304535" y="4026115"/>
-                <a:ext cx="1181095" cy="307777"/>
-              </a:xfrm>
-              <a:prstGeom prst="rect">
-                <a:avLst/>
-              </a:prstGeom>
-              <a:noFill/>
-            </p:spPr>
-            <p:txBody>
-              <a:bodyPr wrap="square" rtlCol="0">
-                <a:spAutoFit/>
-              </a:bodyPr>
-              <a:lstStyle/>
-              <a:p>
-                <a:r>
-                  <a:rPr lang="en-US" sz="1400" dirty="0" smtClean="0">
-                    <a:latin typeface="Times New Roman" panose="02020603050405020304" pitchFamily="18" charset="0"/>
-                    <a:cs typeface="Times New Roman" panose="02020603050405020304" pitchFamily="18" charset="0"/>
-                  </a:rPr>
-                  <a:t>Ion Trap</a:t>
-                </a:r>
-                <a:endParaRPr lang="en-US" sz="1400" dirty="0">
-                  <a:latin typeface="Times New Roman" panose="02020603050405020304" pitchFamily="18" charset="0"/>
-                  <a:cs typeface="Times New Roman" panose="02020603050405020304" pitchFamily="18" charset="0"/>
-                </a:endParaRPr>
-              </a:p>
-            </p:txBody>
-          </p:sp>
-        </p:grpSp>
-        <p:sp>
-          <p:nvSpPr>
-            <p:cNvPr id="33" name="矩形 32"/>
-            <p:cNvSpPr/>
-            <p:nvPr/>
-          </p:nvSpPr>
-          <p:spPr>
-            <a:xfrm>
-              <a:off x="6981160" y="4345580"/>
-              <a:ext cx="703105" cy="364382"/>
-            </a:xfrm>
-            <a:prstGeom prst="rect">
-              <a:avLst/>
-            </a:prstGeom>
-            <a:solidFill>
-              <a:schemeClr val="bg1"/>
-            </a:solidFill>
-            <a:ln w="25400">
-              <a:solidFill>
-                <a:schemeClr val="tx1"/>
-              </a:solidFill>
-            </a:ln>
-          </p:spPr>
-          <p:style>
-            <a:lnRef idx="2">
-              <a:schemeClr val="accent1">
-                <a:shade val="50000"/>
-              </a:schemeClr>
-            </a:lnRef>
-            <a:fillRef idx="1">
-              <a:schemeClr val="accent1"/>
-            </a:fillRef>
-            <a:effectRef idx="0">
-              <a:schemeClr val="accent1"/>
-            </a:effectRef>
-            <a:fontRef idx="minor">
-              <a:schemeClr val="lt1"/>
-            </a:fontRef>
-          </p:style>
-          <p:txBody>
-            <a:bodyPr rtlCol="0" anchor="ctr"/>
-            <a:lstStyle/>
-            <a:p>
-              <a:pPr algn="ctr"/>
-              <a:endParaRPr lang="en-US"/>
-            </a:p>
-          </p:txBody>
-        </p:sp>
-        <p:sp>
-          <p:nvSpPr>
-            <p:cNvPr id="36" name="文字方塊 35"/>
-            <p:cNvSpPr txBox="1"/>
-            <p:nvPr/>
-          </p:nvSpPr>
-          <p:spPr>
-            <a:xfrm>
-              <a:off x="6510867" y="4032357"/>
-              <a:ext cx="1859016" cy="307777"/>
+              <a:off x="7304535" y="4026115"/>
+              <a:ext cx="1181095" cy="307777"/>
             </a:xfrm>
             <a:prstGeom prst="rect">
               <a:avLst/>
@@ -3496,7 +3393,7 @@
                   <a:latin typeface="Times New Roman" panose="02020603050405020304" pitchFamily="18" charset="0"/>
                   <a:cs typeface="Times New Roman" panose="02020603050405020304" pitchFamily="18" charset="0"/>
                 </a:rPr>
-                <a:t>High Voltage Amplifier</a:t>
+                <a:t>Ion Trap</a:t>
               </a:r>
               <a:endParaRPr lang="en-US" sz="1400" dirty="0">
                 <a:latin typeface="Times New Roman" panose="02020603050405020304" pitchFamily="18" charset="0"/>
@@ -3505,151 +3402,390 @@
             </a:p>
           </p:txBody>
         </p:sp>
-        <p:cxnSp>
-          <p:nvCxnSpPr>
-            <p:cNvPr id="37" name="直線單箭頭接點 36"/>
-            <p:cNvCxnSpPr/>
-            <p:nvPr/>
-          </p:nvCxnSpPr>
-          <p:spPr>
-            <a:xfrm>
-              <a:off x="7808689" y="4509366"/>
-              <a:ext cx="622389" cy="0"/>
-            </a:xfrm>
-            <a:prstGeom prst="straightConnector1">
-              <a:avLst/>
-            </a:prstGeom>
-            <a:ln>
-              <a:solidFill>
-                <a:schemeClr val="tx1"/>
-              </a:solidFill>
-              <a:tailEnd type="triangle"/>
-            </a:ln>
-          </p:spPr>
-          <p:style>
-            <a:lnRef idx="1">
-              <a:schemeClr val="accent1"/>
-            </a:lnRef>
-            <a:fillRef idx="0">
-              <a:schemeClr val="accent1"/>
-            </a:fillRef>
-            <a:effectRef idx="0">
-              <a:schemeClr val="accent1"/>
-            </a:effectRef>
-            <a:fontRef idx="minor">
+      </p:grpSp>
+      <p:sp>
+        <p:nvSpPr>
+          <p:cNvPr id="33" name="矩形 32"/>
+          <p:cNvSpPr/>
+          <p:nvPr/>
+        </p:nvSpPr>
+        <p:spPr>
+          <a:xfrm>
+            <a:off x="6190748" y="3989118"/>
+            <a:ext cx="703105" cy="364382"/>
+          </a:xfrm>
+          <a:prstGeom prst="rect">
+            <a:avLst/>
+          </a:prstGeom>
+          <a:solidFill>
+            <a:schemeClr val="bg1"/>
+          </a:solidFill>
+          <a:ln w="25400">
+            <a:solidFill>
               <a:schemeClr val="tx1"/>
-            </a:fontRef>
-          </p:style>
-        </p:cxnSp>
-        <p:sp>
-          <p:nvSpPr>
-            <p:cNvPr id="43" name="文字方塊 42"/>
-            <p:cNvSpPr txBox="1"/>
-            <p:nvPr/>
-          </p:nvSpPr>
-          <p:spPr>
-            <a:xfrm>
-              <a:off x="6141890" y="5002610"/>
-              <a:ext cx="1335717" cy="307777"/>
-            </a:xfrm>
-            <a:prstGeom prst="rect">
-              <a:avLst/>
-            </a:prstGeom>
-            <a:noFill/>
-          </p:spPr>
-          <p:txBody>
-            <a:bodyPr wrap="square" rtlCol="0">
-              <a:spAutoFit/>
-            </a:bodyPr>
-            <a:lstStyle/>
-            <a:p>
-              <a:r>
-                <a:rPr lang="en-US" sz="1400" dirty="0" smtClean="0">
-                  <a:latin typeface="Times New Roman" panose="02020603050405020304" pitchFamily="18" charset="0"/>
-                  <a:cs typeface="Times New Roman" panose="02020603050405020304" pitchFamily="18" charset="0"/>
-                </a:rPr>
-                <a:t>Ion Output</a:t>
-              </a:r>
-              <a:endParaRPr lang="en-US" sz="1400" dirty="0">
+            </a:solidFill>
+          </a:ln>
+        </p:spPr>
+        <p:style>
+          <a:lnRef idx="2">
+            <a:schemeClr val="accent1">
+              <a:shade val="50000"/>
+            </a:schemeClr>
+          </a:lnRef>
+          <a:fillRef idx="1">
+            <a:schemeClr val="accent1"/>
+          </a:fillRef>
+          <a:effectRef idx="0">
+            <a:schemeClr val="accent1"/>
+          </a:effectRef>
+          <a:fontRef idx="minor">
+            <a:schemeClr val="lt1"/>
+          </a:fontRef>
+        </p:style>
+        <p:txBody>
+          <a:bodyPr rtlCol="0" anchor="ctr"/>
+          <a:lstStyle/>
+          <a:p>
+            <a:pPr algn="ctr"/>
+            <a:endParaRPr lang="en-US"/>
+          </a:p>
+        </p:txBody>
+      </p:sp>
+      <p:sp>
+        <p:nvSpPr>
+          <p:cNvPr id="36" name="文字方塊 35"/>
+          <p:cNvSpPr txBox="1"/>
+          <p:nvPr/>
+        </p:nvSpPr>
+        <p:spPr>
+          <a:xfrm>
+            <a:off x="6019336" y="3669775"/>
+            <a:ext cx="1154931" cy="307777"/>
+          </a:xfrm>
+          <a:prstGeom prst="rect">
+            <a:avLst/>
+          </a:prstGeom>
+          <a:noFill/>
+        </p:spPr>
+        <p:txBody>
+          <a:bodyPr wrap="square" rtlCol="0">
+            <a:spAutoFit/>
+          </a:bodyPr>
+          <a:lstStyle/>
+          <a:p>
+            <a:r>
+              <a:rPr lang="en-US" sz="1400" dirty="0" smtClean="0">
                 <a:latin typeface="Times New Roman" panose="02020603050405020304" pitchFamily="18" charset="0"/>
                 <a:cs typeface="Times New Roman" panose="02020603050405020304" pitchFamily="18" charset="0"/>
-              </a:endParaRPr>
-            </a:p>
-          </p:txBody>
-        </p:sp>
-        <p:sp>
-          <p:nvSpPr>
-            <p:cNvPr id="44" name="文字方塊 43"/>
-            <p:cNvSpPr txBox="1"/>
-            <p:nvPr/>
-          </p:nvSpPr>
-          <p:spPr>
-            <a:xfrm>
-              <a:off x="3159362" y="5079468"/>
-              <a:ext cx="1423866" cy="307777"/>
-            </a:xfrm>
-            <a:prstGeom prst="rect">
-              <a:avLst/>
-            </a:prstGeom>
-            <a:noFill/>
-          </p:spPr>
-          <p:txBody>
-            <a:bodyPr wrap="square" rtlCol="0">
-              <a:spAutoFit/>
-            </a:bodyPr>
-            <a:lstStyle/>
-            <a:p>
-              <a:r>
-                <a:rPr lang="en-US" sz="1400" dirty="0" smtClean="0">
-                  <a:latin typeface="Times New Roman" panose="02020603050405020304" pitchFamily="18" charset="0"/>
-                  <a:cs typeface="Times New Roman" panose="02020603050405020304" pitchFamily="18" charset="0"/>
-                </a:rPr>
-                <a:t>Data Acquisition</a:t>
-              </a:r>
-              <a:endParaRPr lang="en-US" sz="1400" dirty="0">
+              </a:rPr>
+              <a:t>1</a:t>
+            </a:r>
+            <a:r>
+              <a:rPr lang="en-US" sz="1400" baseline="30000" dirty="0" smtClean="0">
                 <a:latin typeface="Times New Roman" panose="02020603050405020304" pitchFamily="18" charset="0"/>
                 <a:cs typeface="Times New Roman" panose="02020603050405020304" pitchFamily="18" charset="0"/>
-              </a:endParaRPr>
-            </a:p>
-          </p:txBody>
-        </p:sp>
-        <p:cxnSp>
-          <p:nvCxnSpPr>
-            <p:cNvPr id="45" name="直線單箭頭接點 44"/>
-            <p:cNvCxnSpPr/>
-            <p:nvPr/>
-          </p:nvCxnSpPr>
-          <p:spPr>
-            <a:xfrm flipV="1">
-              <a:off x="3596385" y="2916533"/>
-              <a:ext cx="0" cy="1115824"/>
-            </a:xfrm>
-            <a:prstGeom prst="straightConnector1">
-              <a:avLst/>
-            </a:prstGeom>
-            <a:ln>
-              <a:solidFill>
-                <a:schemeClr val="tx1"/>
-              </a:solidFill>
-              <a:tailEnd type="triangle"/>
-            </a:ln>
-          </p:spPr>
-          <p:style>
-            <a:lnRef idx="1">
-              <a:schemeClr val="accent1"/>
-            </a:lnRef>
-            <a:fillRef idx="0">
-              <a:schemeClr val="accent1"/>
-            </a:fillRef>
-            <a:effectRef idx="0">
-              <a:schemeClr val="accent1"/>
-            </a:effectRef>
-            <a:fontRef idx="minor">
+              </a:rPr>
+              <a:t>st </a:t>
+            </a:r>
+            <a:r>
+              <a:rPr lang="en-US" sz="1400" dirty="0" smtClean="0">
+                <a:latin typeface="Times New Roman" panose="02020603050405020304" pitchFamily="18" charset="0"/>
+                <a:cs typeface="Times New Roman" panose="02020603050405020304" pitchFamily="18" charset="0"/>
+              </a:rPr>
+              <a:t>Amplifier</a:t>
+            </a:r>
+            <a:endParaRPr lang="en-US" sz="1400" dirty="0">
+              <a:latin typeface="Times New Roman" panose="02020603050405020304" pitchFamily="18" charset="0"/>
+              <a:cs typeface="Times New Roman" panose="02020603050405020304" pitchFamily="18" charset="0"/>
+            </a:endParaRPr>
+          </a:p>
+        </p:txBody>
+      </p:sp>
+      <p:cxnSp>
+        <p:nvCxnSpPr>
+          <p:cNvPr id="37" name="直線單箭頭接點 36"/>
+          <p:cNvCxnSpPr/>
+          <p:nvPr/>
+        </p:nvCxnSpPr>
+        <p:spPr>
+          <a:xfrm>
+            <a:off x="7018277" y="4152904"/>
+            <a:ext cx="622389" cy="0"/>
+          </a:xfrm>
+          <a:prstGeom prst="straightConnector1">
+            <a:avLst/>
+          </a:prstGeom>
+          <a:ln>
+            <a:solidFill>
               <a:schemeClr val="tx1"/>
-            </a:fontRef>
-          </p:style>
-        </p:cxnSp>
-      </p:grpSp>
+            </a:solidFill>
+            <a:tailEnd type="triangle"/>
+          </a:ln>
+        </p:spPr>
+        <p:style>
+          <a:lnRef idx="1">
+            <a:schemeClr val="accent1"/>
+          </a:lnRef>
+          <a:fillRef idx="0">
+            <a:schemeClr val="accent1"/>
+          </a:fillRef>
+          <a:effectRef idx="0">
+            <a:schemeClr val="accent1"/>
+          </a:effectRef>
+          <a:fontRef idx="minor">
+            <a:schemeClr val="tx1"/>
+          </a:fontRef>
+        </p:style>
+      </p:cxnSp>
+      <p:sp>
+        <p:nvSpPr>
+          <p:cNvPr id="43" name="文字方塊 42"/>
+          <p:cNvSpPr txBox="1"/>
+          <p:nvPr/>
+        </p:nvSpPr>
+        <p:spPr>
+          <a:xfrm>
+            <a:off x="5351478" y="4646148"/>
+            <a:ext cx="1335717" cy="307777"/>
+          </a:xfrm>
+          <a:prstGeom prst="rect">
+            <a:avLst/>
+          </a:prstGeom>
+          <a:noFill/>
+        </p:spPr>
+        <p:txBody>
+          <a:bodyPr wrap="square" rtlCol="0">
+            <a:spAutoFit/>
+          </a:bodyPr>
+          <a:lstStyle/>
+          <a:p>
+            <a:r>
+              <a:rPr lang="en-US" sz="1400" dirty="0" smtClean="0">
+                <a:latin typeface="Times New Roman" panose="02020603050405020304" pitchFamily="18" charset="0"/>
+                <a:cs typeface="Times New Roman" panose="02020603050405020304" pitchFamily="18" charset="0"/>
+              </a:rPr>
+              <a:t>Ion Output</a:t>
+            </a:r>
+            <a:endParaRPr lang="en-US" sz="1400" dirty="0">
+              <a:latin typeface="Times New Roman" panose="02020603050405020304" pitchFamily="18" charset="0"/>
+              <a:cs typeface="Times New Roman" panose="02020603050405020304" pitchFamily="18" charset="0"/>
+            </a:endParaRPr>
+          </a:p>
+        </p:txBody>
+      </p:sp>
+      <p:sp>
+        <p:nvSpPr>
+          <p:cNvPr id="44" name="文字方塊 43"/>
+          <p:cNvSpPr txBox="1"/>
+          <p:nvPr/>
+        </p:nvSpPr>
+        <p:spPr>
+          <a:xfrm>
+            <a:off x="2368950" y="4723006"/>
+            <a:ext cx="1423866" cy="307777"/>
+          </a:xfrm>
+          <a:prstGeom prst="rect">
+            <a:avLst/>
+          </a:prstGeom>
+          <a:noFill/>
+        </p:spPr>
+        <p:txBody>
+          <a:bodyPr wrap="square" rtlCol="0">
+            <a:spAutoFit/>
+          </a:bodyPr>
+          <a:lstStyle/>
+          <a:p>
+            <a:r>
+              <a:rPr lang="en-US" sz="1400" dirty="0" smtClean="0">
+                <a:latin typeface="Times New Roman" panose="02020603050405020304" pitchFamily="18" charset="0"/>
+                <a:cs typeface="Times New Roman" panose="02020603050405020304" pitchFamily="18" charset="0"/>
+              </a:rPr>
+              <a:t>Data Acquisition</a:t>
+            </a:r>
+            <a:endParaRPr lang="en-US" sz="1400" dirty="0">
+              <a:latin typeface="Times New Roman" panose="02020603050405020304" pitchFamily="18" charset="0"/>
+              <a:cs typeface="Times New Roman" panose="02020603050405020304" pitchFamily="18" charset="0"/>
+            </a:endParaRPr>
+          </a:p>
+        </p:txBody>
+      </p:sp>
+      <p:cxnSp>
+        <p:nvCxnSpPr>
+          <p:cNvPr id="45" name="直線單箭頭接點 44"/>
+          <p:cNvCxnSpPr/>
+          <p:nvPr/>
+        </p:nvCxnSpPr>
+        <p:spPr>
+          <a:xfrm flipV="1">
+            <a:off x="2805973" y="2560071"/>
+            <a:ext cx="0" cy="1115824"/>
+          </a:xfrm>
+          <a:prstGeom prst="straightConnector1">
+            <a:avLst/>
+          </a:prstGeom>
+          <a:ln>
+            <a:solidFill>
+              <a:schemeClr val="tx1"/>
+            </a:solidFill>
+            <a:tailEnd type="triangle"/>
+          </a:ln>
+        </p:spPr>
+        <p:style>
+          <a:lnRef idx="1">
+            <a:schemeClr val="accent1"/>
+          </a:lnRef>
+          <a:fillRef idx="0">
+            <a:schemeClr val="accent1"/>
+          </a:fillRef>
+          <a:effectRef idx="0">
+            <a:schemeClr val="accent1"/>
+          </a:effectRef>
+          <a:fontRef idx="minor">
+            <a:schemeClr val="tx1"/>
+          </a:fontRef>
+        </p:style>
+      </p:cxnSp>
+      <p:sp>
+        <p:nvSpPr>
+          <p:cNvPr id="21" name="矩形 20"/>
+          <p:cNvSpPr/>
+          <p:nvPr/>
+        </p:nvSpPr>
+        <p:spPr>
+          <a:xfrm>
+            <a:off x="7776735" y="3994287"/>
+            <a:ext cx="703105" cy="364382"/>
+          </a:xfrm>
+          <a:prstGeom prst="rect">
+            <a:avLst/>
+          </a:prstGeom>
+          <a:solidFill>
+            <a:schemeClr val="bg1"/>
+          </a:solidFill>
+          <a:ln w="25400">
+            <a:solidFill>
+              <a:schemeClr val="tx1"/>
+            </a:solidFill>
+          </a:ln>
+        </p:spPr>
+        <p:style>
+          <a:lnRef idx="2">
+            <a:schemeClr val="accent1">
+              <a:shade val="50000"/>
+            </a:schemeClr>
+          </a:lnRef>
+          <a:fillRef idx="1">
+            <a:schemeClr val="accent1"/>
+          </a:fillRef>
+          <a:effectRef idx="0">
+            <a:schemeClr val="accent1"/>
+          </a:effectRef>
+          <a:fontRef idx="minor">
+            <a:schemeClr val="lt1"/>
+          </a:fontRef>
+        </p:style>
+        <p:txBody>
+          <a:bodyPr rtlCol="0" anchor="ctr"/>
+          <a:lstStyle/>
+          <a:p>
+            <a:pPr algn="ctr"/>
+            <a:endParaRPr lang="en-US"/>
+          </a:p>
+        </p:txBody>
+      </p:sp>
+      <p:cxnSp>
+        <p:nvCxnSpPr>
+          <p:cNvPr id="22" name="直線單箭頭接點 21"/>
+          <p:cNvCxnSpPr/>
+          <p:nvPr/>
+        </p:nvCxnSpPr>
+        <p:spPr>
+          <a:xfrm>
+            <a:off x="8604270" y="4150324"/>
+            <a:ext cx="622389" cy="0"/>
+          </a:xfrm>
+          <a:prstGeom prst="straightConnector1">
+            <a:avLst/>
+          </a:prstGeom>
+          <a:ln>
+            <a:solidFill>
+              <a:schemeClr val="tx1"/>
+            </a:solidFill>
+            <a:tailEnd type="triangle"/>
+          </a:ln>
+        </p:spPr>
+        <p:style>
+          <a:lnRef idx="1">
+            <a:schemeClr val="accent1"/>
+          </a:lnRef>
+          <a:fillRef idx="0">
+            <a:schemeClr val="accent1"/>
+          </a:fillRef>
+          <a:effectRef idx="0">
+            <a:schemeClr val="accent1"/>
+          </a:effectRef>
+          <a:fontRef idx="minor">
+            <a:schemeClr val="tx1"/>
+          </a:fontRef>
+        </p:style>
+      </p:cxnSp>
+      <p:sp>
+        <p:nvSpPr>
+          <p:cNvPr id="25" name="文字方塊 24"/>
+          <p:cNvSpPr txBox="1"/>
+          <p:nvPr/>
+        </p:nvSpPr>
+        <p:spPr>
+          <a:xfrm>
+            <a:off x="7609876" y="3688461"/>
+            <a:ext cx="1179418" cy="307777"/>
+          </a:xfrm>
+          <a:prstGeom prst="rect">
+            <a:avLst/>
+          </a:prstGeom>
+          <a:noFill/>
+        </p:spPr>
+        <p:txBody>
+          <a:bodyPr wrap="square" rtlCol="0">
+            <a:spAutoFit/>
+          </a:bodyPr>
+          <a:lstStyle/>
+          <a:p>
+            <a:r>
+              <a:rPr lang="en-US" sz="1400" dirty="0" smtClean="0">
+                <a:latin typeface="Times New Roman" panose="02020603050405020304" pitchFamily="18" charset="0"/>
+                <a:cs typeface="Times New Roman" panose="02020603050405020304" pitchFamily="18" charset="0"/>
+              </a:rPr>
+              <a:t>2</a:t>
+            </a:r>
+            <a:r>
+              <a:rPr lang="en-US" sz="1400" baseline="30000" dirty="0" smtClean="0">
+                <a:latin typeface="Times New Roman" panose="02020603050405020304" pitchFamily="18" charset="0"/>
+                <a:cs typeface="Times New Roman" panose="02020603050405020304" pitchFamily="18" charset="0"/>
+              </a:rPr>
+              <a:t>st</a:t>
+            </a:r>
+            <a:r>
+              <a:rPr lang="en-US" sz="1400" dirty="0">
+                <a:latin typeface="Times New Roman" panose="02020603050405020304" pitchFamily="18" charset="0"/>
+                <a:cs typeface="Times New Roman" panose="02020603050405020304" pitchFamily="18" charset="0"/>
+              </a:rPr>
+              <a:t> </a:t>
+            </a:r>
+            <a:r>
+              <a:rPr lang="en-US" sz="1400" dirty="0" smtClean="0">
+                <a:latin typeface="Times New Roman" panose="02020603050405020304" pitchFamily="18" charset="0"/>
+                <a:cs typeface="Times New Roman" panose="02020603050405020304" pitchFamily="18" charset="0"/>
+              </a:rPr>
+              <a:t>Amplifier</a:t>
+            </a:r>
+            <a:endParaRPr lang="en-US" sz="1400" dirty="0">
+              <a:latin typeface="Times New Roman" panose="02020603050405020304" pitchFamily="18" charset="0"/>
+              <a:cs typeface="Times New Roman" panose="02020603050405020304" pitchFamily="18" charset="0"/>
+            </a:endParaRPr>
+          </a:p>
+        </p:txBody>
+      </p:sp>
     </p:spTree>
     <p:extLst>
       <p:ext uri="{BB962C8B-B14F-4D97-AF65-F5344CB8AC3E}">

</xml_diff>